<commit_message>
Added procedures for quality analysis, along with a LabView personality and picture of the latest case (v0.3).
</commit_message>
<xml_diff>
--- a/ChaprSVN/WESTA Presentation.pptx
+++ b/ChaprSVN/WESTA Presentation.pptx
@@ -8,9 +8,15 @@
     <p:sldId id="256" r:id="rId2"/>
     <p:sldId id="257" r:id="rId3"/>
     <p:sldId id="258" r:id="rId4"/>
-    <p:sldId id="259" r:id="rId5"/>
-    <p:sldId id="260" r:id="rId6"/>
-    <p:sldId id="261" r:id="rId7"/>
+    <p:sldId id="262" r:id="rId5"/>
+    <p:sldId id="263" r:id="rId6"/>
+    <p:sldId id="264" r:id="rId7"/>
+    <p:sldId id="265" r:id="rId8"/>
+    <p:sldId id="266" r:id="rId9"/>
+    <p:sldId id="259" r:id="rId10"/>
+    <p:sldId id="267" r:id="rId11"/>
+    <p:sldId id="260" r:id="rId12"/>
+    <p:sldId id="261" r:id="rId13"/>
   </p:sldIdLst>
   <p:sldSz cx="9144000" cy="6858000" type="screen4x3"/>
   <p:notesSz cx="6858000" cy="9144000"/>
@@ -293,7 +299,8 @@
           <a:p>
             <a:fld id="{02176B21-4EA1-4084-A24C-8787C57D0319}" type="datetimeFigureOut">
               <a:rPr lang="en-US" smtClean="0"/>
-              <a:t>9/14/2013</a:t>
+              <a:pPr/>
+              <a:t>9/16/2013</a:t>
             </a:fld>
             <a:endParaRPr lang="en-US"/>
           </a:p>
@@ -335,6 +342,7 @@
           <a:p>
             <a:fld id="{7C46BEE2-D8F6-45FC-AD4F-A1E4D64E96D4}" type="slidenum">
               <a:rPr lang="en-US" smtClean="0"/>
+              <a:pPr/>
               <a:t>‹#›</a:t>
             </a:fld>
             <a:endParaRPr lang="en-US"/>
@@ -458,7 +466,8 @@
           <a:p>
             <a:fld id="{02176B21-4EA1-4084-A24C-8787C57D0319}" type="datetimeFigureOut">
               <a:rPr lang="en-US" smtClean="0"/>
-              <a:t>9/14/2013</a:t>
+              <a:pPr/>
+              <a:t>9/16/2013</a:t>
             </a:fld>
             <a:endParaRPr lang="en-US"/>
           </a:p>
@@ -500,6 +509,7 @@
           <a:p>
             <a:fld id="{7C46BEE2-D8F6-45FC-AD4F-A1E4D64E96D4}" type="slidenum">
               <a:rPr lang="en-US" smtClean="0"/>
+              <a:pPr/>
               <a:t>‹#›</a:t>
             </a:fld>
             <a:endParaRPr lang="en-US"/>
@@ -633,7 +643,8 @@
           <a:p>
             <a:fld id="{02176B21-4EA1-4084-A24C-8787C57D0319}" type="datetimeFigureOut">
               <a:rPr lang="en-US" smtClean="0"/>
-              <a:t>9/14/2013</a:t>
+              <a:pPr/>
+              <a:t>9/16/2013</a:t>
             </a:fld>
             <a:endParaRPr lang="en-US"/>
           </a:p>
@@ -675,6 +686,7 @@
           <a:p>
             <a:fld id="{7C46BEE2-D8F6-45FC-AD4F-A1E4D64E96D4}" type="slidenum">
               <a:rPr lang="en-US" smtClean="0"/>
+              <a:pPr/>
               <a:t>‹#›</a:t>
             </a:fld>
             <a:endParaRPr lang="en-US"/>
@@ -798,7 +810,8 @@
           <a:p>
             <a:fld id="{02176B21-4EA1-4084-A24C-8787C57D0319}" type="datetimeFigureOut">
               <a:rPr lang="en-US" smtClean="0"/>
-              <a:t>9/14/2013</a:t>
+              <a:pPr/>
+              <a:t>9/16/2013</a:t>
             </a:fld>
             <a:endParaRPr lang="en-US"/>
           </a:p>
@@ -840,6 +853,7 @@
           <a:p>
             <a:fld id="{7C46BEE2-D8F6-45FC-AD4F-A1E4D64E96D4}" type="slidenum">
               <a:rPr lang="en-US" smtClean="0"/>
+              <a:pPr/>
               <a:t>‹#›</a:t>
             </a:fld>
             <a:endParaRPr lang="en-US"/>
@@ -1039,7 +1053,8 @@
           <a:p>
             <a:fld id="{02176B21-4EA1-4084-A24C-8787C57D0319}" type="datetimeFigureOut">
               <a:rPr lang="en-US" smtClean="0"/>
-              <a:t>9/14/2013</a:t>
+              <a:pPr/>
+              <a:t>9/16/2013</a:t>
             </a:fld>
             <a:endParaRPr lang="en-US"/>
           </a:p>
@@ -1081,6 +1096,7 @@
           <a:p>
             <a:fld id="{7C46BEE2-D8F6-45FC-AD4F-A1E4D64E96D4}" type="slidenum">
               <a:rPr lang="en-US" smtClean="0"/>
+              <a:pPr/>
               <a:t>‹#›</a:t>
             </a:fld>
             <a:endParaRPr lang="en-US"/>
@@ -1322,7 +1338,8 @@
           <a:p>
             <a:fld id="{02176B21-4EA1-4084-A24C-8787C57D0319}" type="datetimeFigureOut">
               <a:rPr lang="en-US" smtClean="0"/>
-              <a:t>9/14/2013</a:t>
+              <a:pPr/>
+              <a:t>9/16/2013</a:t>
             </a:fld>
             <a:endParaRPr lang="en-US"/>
           </a:p>
@@ -1364,6 +1381,7 @@
           <a:p>
             <a:fld id="{7C46BEE2-D8F6-45FC-AD4F-A1E4D64E96D4}" type="slidenum">
               <a:rPr lang="en-US" smtClean="0"/>
+              <a:pPr/>
               <a:t>‹#›</a:t>
             </a:fld>
             <a:endParaRPr lang="en-US"/>
@@ -1739,7 +1757,8 @@
           <a:p>
             <a:fld id="{02176B21-4EA1-4084-A24C-8787C57D0319}" type="datetimeFigureOut">
               <a:rPr lang="en-US" smtClean="0"/>
-              <a:t>9/14/2013</a:t>
+              <a:pPr/>
+              <a:t>9/16/2013</a:t>
             </a:fld>
             <a:endParaRPr lang="en-US"/>
           </a:p>
@@ -1781,6 +1800,7 @@
           <a:p>
             <a:fld id="{7C46BEE2-D8F6-45FC-AD4F-A1E4D64E96D4}" type="slidenum">
               <a:rPr lang="en-US" smtClean="0"/>
+              <a:pPr/>
               <a:t>‹#›</a:t>
             </a:fld>
             <a:endParaRPr lang="en-US"/>
@@ -1852,7 +1872,8 @@
           <a:p>
             <a:fld id="{02176B21-4EA1-4084-A24C-8787C57D0319}" type="datetimeFigureOut">
               <a:rPr lang="en-US" smtClean="0"/>
-              <a:t>9/14/2013</a:t>
+              <a:pPr/>
+              <a:t>9/16/2013</a:t>
             </a:fld>
             <a:endParaRPr lang="en-US"/>
           </a:p>
@@ -1894,6 +1915,7 @@
           <a:p>
             <a:fld id="{7C46BEE2-D8F6-45FC-AD4F-A1E4D64E96D4}" type="slidenum">
               <a:rPr lang="en-US" smtClean="0"/>
+              <a:pPr/>
               <a:t>‹#›</a:t>
             </a:fld>
             <a:endParaRPr lang="en-US"/>
@@ -1942,7 +1964,8 @@
           <a:p>
             <a:fld id="{02176B21-4EA1-4084-A24C-8787C57D0319}" type="datetimeFigureOut">
               <a:rPr lang="en-US" smtClean="0"/>
-              <a:t>9/14/2013</a:t>
+              <a:pPr/>
+              <a:t>9/16/2013</a:t>
             </a:fld>
             <a:endParaRPr lang="en-US"/>
           </a:p>
@@ -1984,6 +2007,7 @@
           <a:p>
             <a:fld id="{7C46BEE2-D8F6-45FC-AD4F-A1E4D64E96D4}" type="slidenum">
               <a:rPr lang="en-US" smtClean="0"/>
+              <a:pPr/>
               <a:t>‹#›</a:t>
             </a:fld>
             <a:endParaRPr lang="en-US"/>
@@ -2214,7 +2238,8 @@
           <a:p>
             <a:fld id="{02176B21-4EA1-4084-A24C-8787C57D0319}" type="datetimeFigureOut">
               <a:rPr lang="en-US" smtClean="0"/>
-              <a:t>9/14/2013</a:t>
+              <a:pPr/>
+              <a:t>9/16/2013</a:t>
             </a:fld>
             <a:endParaRPr lang="en-US"/>
           </a:p>
@@ -2256,6 +2281,7 @@
           <a:p>
             <a:fld id="{7C46BEE2-D8F6-45FC-AD4F-A1E4D64E96D4}" type="slidenum">
               <a:rPr lang="en-US" smtClean="0"/>
+              <a:pPr/>
               <a:t>‹#›</a:t>
             </a:fld>
             <a:endParaRPr lang="en-US"/>
@@ -2462,7 +2488,8 @@
           <a:p>
             <a:fld id="{02176B21-4EA1-4084-A24C-8787C57D0319}" type="datetimeFigureOut">
               <a:rPr lang="en-US" smtClean="0"/>
-              <a:t>9/14/2013</a:t>
+              <a:pPr/>
+              <a:t>9/16/2013</a:t>
             </a:fld>
             <a:endParaRPr lang="en-US"/>
           </a:p>
@@ -2504,6 +2531,7 @@
           <a:p>
             <a:fld id="{7C46BEE2-D8F6-45FC-AD4F-A1E4D64E96D4}" type="slidenum">
               <a:rPr lang="en-US" smtClean="0"/>
+              <a:pPr/>
               <a:t>‹#›</a:t>
             </a:fld>
             <a:endParaRPr lang="en-US"/>
@@ -2670,7 +2698,8 @@
           <a:p>
             <a:fld id="{02176B21-4EA1-4084-A24C-8787C57D0319}" type="datetimeFigureOut">
               <a:rPr lang="en-US" smtClean="0"/>
-              <a:t>9/14/2013</a:t>
+              <a:pPr/>
+              <a:t>9/16/2013</a:t>
             </a:fld>
             <a:endParaRPr lang="en-US"/>
           </a:p>
@@ -2748,6 +2777,7 @@
           <a:p>
             <a:fld id="{7C46BEE2-D8F6-45FC-AD4F-A1E4D64E96D4}" type="slidenum">
               <a:rPr lang="en-US" smtClean="0"/>
+              <a:pPr/>
               <a:t>‹#›</a:t>
             </a:fld>
             <a:endParaRPr lang="en-US"/>
@@ -3056,10 +3086,18 @@
           <a:lstStyle/>
           <a:p>
             <a:r>
-              <a:rPr lang="en-US" dirty="0" smtClean="0"/>
+              <a:rPr lang="en-US" dirty="0" smtClean="0">
+                <a:solidFill>
+                  <a:schemeClr val="accent1"/>
+                </a:solidFill>
+              </a:rPr>
               <a:t>The ChapR Presentation</a:t>
             </a:r>
-            <a:endParaRPr lang="en-US" dirty="0"/>
+            <a:endParaRPr lang="en-US" dirty="0">
+              <a:solidFill>
+                <a:schemeClr val="accent1"/>
+              </a:solidFill>
+            </a:endParaRPr>
           </a:p>
         </p:txBody>
       </p:sp>
@@ -3094,6 +3132,750 @@
       </p:par>
     </p:tnLst>
   </p:timing>
+</p:sld>
+</file>
+
+<file path=ppt/slides/slide10.xml><?xml version="1.0" encoding="utf-8"?>
+<p:sld xmlns:a="http://schemas.openxmlformats.org/drawingml/2006/main" xmlns:r="http://schemas.openxmlformats.org/officeDocument/2006/relationships" xmlns:p="http://schemas.openxmlformats.org/presentationml/2006/main">
+  <p:cSld>
+    <p:spTree>
+      <p:nvGrpSpPr>
+        <p:cNvPr id="1" name=""/>
+        <p:cNvGrpSpPr/>
+        <p:nvPr/>
+      </p:nvGrpSpPr>
+      <p:grpSpPr>
+        <a:xfrm>
+          <a:off x="0" y="0"/>
+          <a:ext cx="0" cy="0"/>
+          <a:chOff x="0" y="0"/>
+          <a:chExt cx="0" cy="0"/>
+        </a:xfrm>
+      </p:grpSpPr>
+      <p:sp>
+        <p:nvSpPr>
+          <p:cNvPr id="2" name="Title 1"/>
+          <p:cNvSpPr>
+            <a:spLocks noGrp="1"/>
+          </p:cNvSpPr>
+          <p:nvPr>
+            <p:ph type="title"/>
+          </p:nvPr>
+        </p:nvSpPr>
+        <p:spPr/>
+        <p:txBody>
+          <a:bodyPr/>
+          <a:lstStyle/>
+          <a:p>
+            <a:r>
+              <a:rPr lang="en-US" dirty="0" smtClean="0">
+                <a:solidFill>
+                  <a:schemeClr val="accent1"/>
+                </a:solidFill>
+              </a:rPr>
+              <a:t>ChapR Benefits: Westlake</a:t>
+            </a:r>
+            <a:endParaRPr lang="en-US" dirty="0">
+              <a:solidFill>
+                <a:schemeClr val="accent1"/>
+              </a:solidFill>
+            </a:endParaRPr>
+          </a:p>
+        </p:txBody>
+      </p:sp>
+      <p:sp>
+        <p:nvSpPr>
+          <p:cNvPr id="3" name="Content Placeholder 2"/>
+          <p:cNvSpPr>
+            <a:spLocks noGrp="1"/>
+          </p:cNvSpPr>
+          <p:nvPr>
+            <p:ph idx="1"/>
+          </p:nvPr>
+        </p:nvSpPr>
+        <p:spPr/>
+        <p:txBody>
+          <a:bodyPr>
+            <a:normAutofit fontScale="92500" lnSpcReduction="20000"/>
+          </a:bodyPr>
+          <a:lstStyle/>
+          <a:p>
+            <a:r>
+              <a:rPr lang="en-US" dirty="0" smtClean="0">
+                <a:solidFill>
+                  <a:schemeClr val="accent1"/>
+                </a:solidFill>
+              </a:rPr>
+              <a:t>Experience in product design, development and delivery (marketing, sales, manufacturing etc.)</a:t>
+            </a:r>
+          </a:p>
+          <a:p>
+            <a:r>
+              <a:rPr lang="en-US" dirty="0" smtClean="0">
+                <a:solidFill>
+                  <a:schemeClr val="accent1"/>
+                </a:solidFill>
+              </a:rPr>
+              <a:t>Chance to give back to the FTC community and spread STEM</a:t>
+            </a:r>
+          </a:p>
+          <a:p>
+            <a:pPr lvl="1"/>
+            <a:r>
+              <a:rPr lang="en-US" dirty="0" smtClean="0">
+                <a:solidFill>
+                  <a:schemeClr val="accent1"/>
+                </a:solidFill>
+              </a:rPr>
+              <a:t>Every 4</a:t>
+            </a:r>
+            <a:r>
+              <a:rPr lang="en-US" baseline="30000" dirty="0" smtClean="0">
+                <a:solidFill>
+                  <a:schemeClr val="accent1"/>
+                </a:solidFill>
+              </a:rPr>
+              <a:t>th</a:t>
+            </a:r>
+            <a:r>
+              <a:rPr lang="en-US" dirty="0" smtClean="0">
+                <a:solidFill>
+                  <a:schemeClr val="accent1"/>
+                </a:solidFill>
+              </a:rPr>
+              <a:t> ChapR is given to a team in need for </a:t>
+            </a:r>
+            <a:r>
+              <a:rPr lang="en-US" dirty="0" smtClean="0">
+                <a:solidFill>
+                  <a:schemeClr val="accent1"/>
+                </a:solidFill>
+              </a:rPr>
+              <a:t>free</a:t>
+            </a:r>
+          </a:p>
+          <a:p>
+            <a:pPr lvl="1"/>
+            <a:r>
+              <a:rPr lang="en-US" dirty="0" smtClean="0">
+                <a:solidFill>
+                  <a:schemeClr val="accent1"/>
+                </a:solidFill>
+              </a:rPr>
+              <a:t>Service hours and experience for Westlake students making </a:t>
+            </a:r>
+            <a:r>
+              <a:rPr lang="en-US" dirty="0" err="1" smtClean="0">
+                <a:solidFill>
+                  <a:schemeClr val="accent1"/>
+                </a:solidFill>
+              </a:rPr>
+              <a:t>ChapRs</a:t>
+            </a:r>
+            <a:endParaRPr lang="en-US" dirty="0" smtClean="0">
+              <a:solidFill>
+                <a:schemeClr val="accent1"/>
+              </a:solidFill>
+            </a:endParaRPr>
+          </a:p>
+          <a:p>
+            <a:r>
+              <a:rPr lang="en-US" dirty="0" smtClean="0">
+                <a:solidFill>
+                  <a:schemeClr val="accent1"/>
+                </a:solidFill>
+              </a:rPr>
+              <a:t>Spreading the name of Westlake </a:t>
+            </a:r>
+            <a:r>
+              <a:rPr lang="en-US" dirty="0" smtClean="0">
+                <a:solidFill>
+                  <a:schemeClr val="accent1"/>
+                </a:solidFill>
+              </a:rPr>
+              <a:t>Robotics</a:t>
+            </a:r>
+          </a:p>
+          <a:p>
+            <a:r>
+              <a:rPr lang="en-US" dirty="0" smtClean="0">
+                <a:solidFill>
+                  <a:schemeClr val="accent1"/>
+                </a:solidFill>
+              </a:rPr>
+              <a:t>Patent </a:t>
+            </a:r>
+            <a:r>
+              <a:rPr lang="en-US" dirty="0" smtClean="0">
+                <a:solidFill>
+                  <a:schemeClr val="accent1"/>
+                </a:solidFill>
+              </a:rPr>
+              <a:t>for </a:t>
+            </a:r>
+            <a:r>
+              <a:rPr lang="en-US" dirty="0" smtClean="0">
+                <a:solidFill>
+                  <a:schemeClr val="accent1"/>
+                </a:solidFill>
+              </a:rPr>
+              <a:t>WESTA (hopefully)</a:t>
+            </a:r>
+            <a:endParaRPr lang="en-US" dirty="0" smtClean="0">
+              <a:solidFill>
+                <a:schemeClr val="accent1"/>
+              </a:solidFill>
+            </a:endParaRPr>
+          </a:p>
+          <a:p>
+            <a:r>
+              <a:rPr lang="en-US" dirty="0" smtClean="0">
+                <a:solidFill>
+                  <a:schemeClr val="accent1"/>
+                </a:solidFill>
+              </a:rPr>
+              <a:t>Something </a:t>
+            </a:r>
+            <a:r>
+              <a:rPr lang="en-US" dirty="0" smtClean="0">
+                <a:solidFill>
+                  <a:schemeClr val="accent1"/>
+                </a:solidFill>
+              </a:rPr>
+              <a:t>to talk about for </a:t>
+            </a:r>
+            <a:r>
+              <a:rPr lang="en-US" dirty="0" smtClean="0">
+                <a:solidFill>
+                  <a:schemeClr val="accent1"/>
+                </a:solidFill>
+              </a:rPr>
+              <a:t>awards</a:t>
+            </a:r>
+            <a:endParaRPr lang="en-US" dirty="0" smtClean="0">
+              <a:solidFill>
+                <a:schemeClr val="accent1"/>
+              </a:solidFill>
+            </a:endParaRPr>
+          </a:p>
+        </p:txBody>
+      </p:sp>
+      <p:pic>
+        <p:nvPicPr>
+          <p:cNvPr id="4" name="Picture 3" descr="Logo.png"/>
+          <p:cNvPicPr>
+            <a:picLocks noChangeAspect="1"/>
+          </p:cNvPicPr>
+          <p:nvPr/>
+        </p:nvPicPr>
+        <p:blipFill>
+          <a:blip r:embed="rId2" cstate="print"/>
+          <a:stretch>
+            <a:fillRect/>
+          </a:stretch>
+        </p:blipFill>
+        <p:spPr>
+          <a:xfrm>
+            <a:off x="6412614" y="5029200"/>
+            <a:ext cx="2731386" cy="1828800"/>
+          </a:xfrm>
+          <a:prstGeom prst="rect">
+            <a:avLst/>
+          </a:prstGeom>
+        </p:spPr>
+      </p:pic>
+    </p:spTree>
+  </p:cSld>
+  <p:clrMapOvr>
+    <a:masterClrMapping/>
+  </p:clrMapOvr>
+  <p:timing>
+    <p:tnLst>
+      <p:par>
+        <p:cTn id="1" dur="indefinite" restart="never" nodeType="tmRoot"/>
+      </p:par>
+    </p:tnLst>
+  </p:timing>
+</p:sld>
+</file>
+
+<file path=ppt/slides/slide11.xml><?xml version="1.0" encoding="utf-8"?>
+<p:sld xmlns:a="http://schemas.openxmlformats.org/drawingml/2006/main" xmlns:r="http://schemas.openxmlformats.org/officeDocument/2006/relationships" xmlns:p="http://schemas.openxmlformats.org/presentationml/2006/main">
+  <p:cSld>
+    <p:spTree>
+      <p:nvGrpSpPr>
+        <p:cNvPr id="1" name=""/>
+        <p:cNvGrpSpPr/>
+        <p:nvPr/>
+      </p:nvGrpSpPr>
+      <p:grpSpPr>
+        <a:xfrm>
+          <a:off x="0" y="0"/>
+          <a:ext cx="0" cy="0"/>
+          <a:chOff x="0" y="0"/>
+          <a:chExt cx="0" cy="0"/>
+        </a:xfrm>
+      </p:grpSpPr>
+      <p:sp>
+        <p:nvSpPr>
+          <p:cNvPr id="2" name="Title 1"/>
+          <p:cNvSpPr>
+            <a:spLocks noGrp="1"/>
+          </p:cNvSpPr>
+          <p:nvPr>
+            <p:ph type="title"/>
+          </p:nvPr>
+        </p:nvSpPr>
+        <p:spPr/>
+        <p:txBody>
+          <a:bodyPr/>
+          <a:lstStyle/>
+          <a:p>
+            <a:r>
+              <a:rPr lang="en-US" dirty="0" smtClean="0">
+                <a:solidFill>
+                  <a:schemeClr val="accent1"/>
+                </a:solidFill>
+              </a:rPr>
+              <a:t>Plan</a:t>
+            </a:r>
+            <a:endParaRPr lang="en-US" dirty="0">
+              <a:solidFill>
+                <a:schemeClr val="accent1"/>
+              </a:solidFill>
+            </a:endParaRPr>
+          </a:p>
+        </p:txBody>
+      </p:sp>
+      <p:sp>
+        <p:nvSpPr>
+          <p:cNvPr id="3" name="Content Placeholder 2"/>
+          <p:cNvSpPr>
+            <a:spLocks noGrp="1"/>
+          </p:cNvSpPr>
+          <p:nvPr>
+            <p:ph idx="1"/>
+          </p:nvPr>
+        </p:nvSpPr>
+        <p:spPr/>
+        <p:txBody>
+          <a:bodyPr>
+            <a:normAutofit fontScale="85000" lnSpcReduction="10000"/>
+          </a:bodyPr>
+          <a:lstStyle/>
+          <a:p>
+            <a:r>
+              <a:rPr lang="en-US" dirty="0" smtClean="0">
+                <a:solidFill>
+                  <a:schemeClr val="accent1"/>
+                </a:solidFill>
+              </a:rPr>
+              <a:t>Buy parts for 10 </a:t>
+            </a:r>
+            <a:r>
+              <a:rPr lang="en-US" dirty="0" err="1" smtClean="0">
+                <a:solidFill>
+                  <a:schemeClr val="accent1"/>
+                </a:solidFill>
+              </a:rPr>
+              <a:t>ChapRs</a:t>
+            </a:r>
+            <a:r>
+              <a:rPr lang="en-US" dirty="0" smtClean="0">
+                <a:solidFill>
+                  <a:schemeClr val="accent1"/>
+                </a:solidFill>
+              </a:rPr>
+              <a:t> (20 boards have been ordered)</a:t>
+            </a:r>
+          </a:p>
+          <a:p>
+            <a:r>
+              <a:rPr lang="en-US" dirty="0" smtClean="0">
+                <a:solidFill>
+                  <a:schemeClr val="accent1"/>
+                </a:solidFill>
+              </a:rPr>
+              <a:t>Set up 3 soldering stations and train 6 people to solder boards (3 of which would be the ChapR team)</a:t>
+            </a:r>
+          </a:p>
+          <a:p>
+            <a:r>
+              <a:rPr lang="en-US" dirty="0" smtClean="0">
+                <a:solidFill>
+                  <a:schemeClr val="accent1"/>
+                </a:solidFill>
+              </a:rPr>
+              <a:t>Get back in touch with the people who initially showed interest</a:t>
+            </a:r>
+          </a:p>
+          <a:p>
+            <a:r>
+              <a:rPr lang="en-US" dirty="0" smtClean="0">
+                <a:solidFill>
+                  <a:schemeClr val="accent1"/>
+                </a:solidFill>
+              </a:rPr>
+              <a:t>Send a ChapR to </a:t>
+            </a:r>
+            <a:r>
+              <a:rPr lang="en-US" dirty="0" err="1" smtClean="0">
+                <a:solidFill>
+                  <a:schemeClr val="accent1"/>
+                </a:solidFill>
+              </a:rPr>
+              <a:t>Irad</a:t>
+            </a:r>
+            <a:r>
+              <a:rPr lang="en-US" dirty="0" smtClean="0">
+                <a:solidFill>
+                  <a:schemeClr val="accent1"/>
+                </a:solidFill>
+              </a:rPr>
+              <a:t> Allen at VHS and David Calkins at Lego Education</a:t>
+            </a:r>
+          </a:p>
+          <a:p>
+            <a:r>
+              <a:rPr lang="en-US" dirty="0" smtClean="0">
+                <a:solidFill>
+                  <a:schemeClr val="accent1"/>
+                </a:solidFill>
+              </a:rPr>
+              <a:t>Keep in touch with the beta testers and fix bugs if necessary</a:t>
+            </a:r>
+          </a:p>
+          <a:p>
+            <a:r>
+              <a:rPr lang="en-US" dirty="0" smtClean="0">
+                <a:solidFill>
+                  <a:schemeClr val="accent1"/>
+                </a:solidFill>
+              </a:rPr>
+              <a:t>Give  4 </a:t>
+            </a:r>
+            <a:r>
+              <a:rPr lang="en-US" dirty="0" err="1" smtClean="0">
+                <a:solidFill>
+                  <a:schemeClr val="accent1"/>
+                </a:solidFill>
+              </a:rPr>
+              <a:t>ChapRs</a:t>
+            </a:r>
+            <a:r>
+              <a:rPr lang="en-US" dirty="0" smtClean="0">
+                <a:solidFill>
+                  <a:schemeClr val="accent1"/>
+                </a:solidFill>
+              </a:rPr>
+              <a:t> to Westlake</a:t>
+            </a:r>
+          </a:p>
+          <a:p>
+            <a:endParaRPr lang="en-US" dirty="0"/>
+          </a:p>
+        </p:txBody>
+      </p:sp>
+      <p:pic>
+        <p:nvPicPr>
+          <p:cNvPr id="4" name="Picture 3" descr="QR Code for Website.png"/>
+          <p:cNvPicPr>
+            <a:picLocks noChangeAspect="1"/>
+          </p:cNvPicPr>
+          <p:nvPr/>
+        </p:nvPicPr>
+        <p:blipFill>
+          <a:blip r:embed="rId2" cstate="print"/>
+          <a:stretch>
+            <a:fillRect/>
+          </a:stretch>
+        </p:blipFill>
+        <p:spPr>
+          <a:xfrm>
+            <a:off x="7391400" y="5029200"/>
+            <a:ext cx="1600200" cy="1600200"/>
+          </a:xfrm>
+          <a:prstGeom prst="rect">
+            <a:avLst/>
+          </a:prstGeom>
+        </p:spPr>
+      </p:pic>
+    </p:spTree>
+  </p:cSld>
+  <p:clrMapOvr>
+    <a:masterClrMapping/>
+  </p:clrMapOvr>
+</p:sld>
+</file>
+
+<file path=ppt/slides/slide12.xml><?xml version="1.0" encoding="utf-8"?>
+<p:sld xmlns:a="http://schemas.openxmlformats.org/drawingml/2006/main" xmlns:r="http://schemas.openxmlformats.org/officeDocument/2006/relationships" xmlns:p="http://schemas.openxmlformats.org/presentationml/2006/main">
+  <p:cSld>
+    <p:spTree>
+      <p:nvGrpSpPr>
+        <p:cNvPr id="1" name=""/>
+        <p:cNvGrpSpPr/>
+        <p:nvPr/>
+      </p:nvGrpSpPr>
+      <p:grpSpPr>
+        <a:xfrm>
+          <a:off x="0" y="0"/>
+          <a:ext cx="0" cy="0"/>
+          <a:chOff x="0" y="0"/>
+          <a:chExt cx="0" cy="0"/>
+        </a:xfrm>
+      </p:grpSpPr>
+      <p:sp>
+        <p:nvSpPr>
+          <p:cNvPr id="2" name="Title 1"/>
+          <p:cNvSpPr>
+            <a:spLocks noGrp="1"/>
+          </p:cNvSpPr>
+          <p:nvPr>
+            <p:ph type="title"/>
+          </p:nvPr>
+        </p:nvSpPr>
+        <p:spPr/>
+        <p:txBody>
+          <a:bodyPr/>
+          <a:lstStyle/>
+          <a:p>
+            <a:r>
+              <a:rPr lang="en-US" dirty="0" smtClean="0">
+                <a:solidFill>
+                  <a:schemeClr val="accent1"/>
+                </a:solidFill>
+              </a:rPr>
+              <a:t>What do we need?</a:t>
+            </a:r>
+            <a:endParaRPr lang="en-US" dirty="0">
+              <a:solidFill>
+                <a:schemeClr val="accent1"/>
+              </a:solidFill>
+            </a:endParaRPr>
+          </a:p>
+        </p:txBody>
+      </p:sp>
+      <p:sp>
+        <p:nvSpPr>
+          <p:cNvPr id="3" name="Content Placeholder 2"/>
+          <p:cNvSpPr>
+            <a:spLocks noGrp="1"/>
+          </p:cNvSpPr>
+          <p:nvPr>
+            <p:ph idx="1"/>
+          </p:nvPr>
+        </p:nvSpPr>
+        <p:spPr/>
+        <p:txBody>
+          <a:bodyPr>
+            <a:normAutofit lnSpcReduction="10000"/>
+          </a:bodyPr>
+          <a:lstStyle/>
+          <a:p>
+            <a:r>
+              <a:rPr lang="en-US" dirty="0" smtClean="0">
+                <a:solidFill>
+                  <a:schemeClr val="accent1"/>
+                </a:solidFill>
+              </a:rPr>
+              <a:t>$450 total for 3 soldering stations</a:t>
+            </a:r>
+          </a:p>
+          <a:p>
+            <a:r>
+              <a:rPr lang="en-US" dirty="0" smtClean="0">
+                <a:solidFill>
+                  <a:schemeClr val="accent1"/>
+                </a:solidFill>
+              </a:rPr>
+              <a:t>$1125 total for 15 </a:t>
+            </a:r>
+            <a:r>
+              <a:rPr lang="en-US" dirty="0" err="1" smtClean="0">
+                <a:solidFill>
+                  <a:schemeClr val="accent1"/>
+                </a:solidFill>
+              </a:rPr>
+              <a:t>ChapRs</a:t>
+            </a:r>
+            <a:r>
+              <a:rPr lang="en-US" dirty="0" smtClean="0">
+                <a:solidFill>
+                  <a:schemeClr val="accent1"/>
+                </a:solidFill>
+              </a:rPr>
+              <a:t> at cost</a:t>
+            </a:r>
+          </a:p>
+          <a:p>
+            <a:pPr lvl="1"/>
+            <a:r>
+              <a:rPr lang="en-US" dirty="0" smtClean="0">
+                <a:solidFill>
+                  <a:schemeClr val="accent1"/>
+                </a:solidFill>
+              </a:rPr>
+              <a:t>5 to reimburse Coach Eric</a:t>
+            </a:r>
+          </a:p>
+          <a:p>
+            <a:pPr lvl="1"/>
+            <a:r>
+              <a:rPr lang="en-US" dirty="0" smtClean="0">
+                <a:solidFill>
+                  <a:schemeClr val="accent1"/>
+                </a:solidFill>
+              </a:rPr>
+              <a:t>10 to build new </a:t>
+            </a:r>
+            <a:r>
+              <a:rPr lang="en-US" dirty="0" err="1" smtClean="0">
+                <a:solidFill>
+                  <a:schemeClr val="accent1"/>
+                </a:solidFill>
+              </a:rPr>
+              <a:t>ChapRs</a:t>
+            </a:r>
+            <a:endParaRPr lang="en-US" dirty="0">
+              <a:solidFill>
+                <a:schemeClr val="accent1"/>
+              </a:solidFill>
+            </a:endParaRPr>
+          </a:p>
+          <a:p>
+            <a:pPr lvl="1"/>
+            <a:r>
+              <a:rPr lang="en-US" smtClean="0">
+                <a:solidFill>
+                  <a:schemeClr val="accent1"/>
+                </a:solidFill>
+              </a:rPr>
+              <a:t>$</a:t>
+            </a:r>
+            <a:r>
+              <a:rPr lang="en-US" smtClean="0">
+                <a:solidFill>
+                  <a:schemeClr val="accent1"/>
+                </a:solidFill>
+              </a:rPr>
+              <a:t>750</a:t>
+            </a:r>
+            <a:r>
+              <a:rPr lang="en-US" smtClean="0">
+                <a:solidFill>
+                  <a:schemeClr val="accent1"/>
+                </a:solidFill>
+              </a:rPr>
+              <a:t>  </a:t>
+            </a:r>
+            <a:r>
+              <a:rPr lang="en-US" dirty="0" smtClean="0">
+                <a:solidFill>
+                  <a:schemeClr val="accent1"/>
+                </a:solidFill>
+              </a:rPr>
+              <a:t>will  be returned after the sale of the </a:t>
+            </a:r>
+            <a:r>
+              <a:rPr lang="en-US" dirty="0" err="1" smtClean="0">
+                <a:solidFill>
+                  <a:schemeClr val="accent1"/>
+                </a:solidFill>
+              </a:rPr>
+              <a:t>ChapRs</a:t>
+            </a:r>
+            <a:r>
+              <a:rPr lang="en-US" dirty="0" smtClean="0">
+                <a:solidFill>
+                  <a:schemeClr val="accent1"/>
+                </a:solidFill>
+              </a:rPr>
+              <a:t> (minus the 4 that go to </a:t>
+            </a:r>
+            <a:r>
+              <a:rPr lang="en-US" dirty="0">
+                <a:solidFill>
+                  <a:schemeClr val="accent1"/>
+                </a:solidFill>
+              </a:rPr>
+              <a:t>W</a:t>
+            </a:r>
+            <a:r>
+              <a:rPr lang="en-US" dirty="0" smtClean="0">
+                <a:solidFill>
+                  <a:schemeClr val="accent1"/>
+                </a:solidFill>
+              </a:rPr>
+              <a:t>estlake</a:t>
+            </a:r>
+            <a:r>
+              <a:rPr lang="en-US" dirty="0" smtClean="0">
+                <a:solidFill>
+                  <a:schemeClr val="accent1"/>
+                </a:solidFill>
+              </a:rPr>
+              <a:t>)</a:t>
+            </a:r>
+          </a:p>
+          <a:p>
+            <a:pPr lvl="1"/>
+            <a:endParaRPr lang="en-US" dirty="0" smtClean="0">
+              <a:solidFill>
+                <a:schemeClr val="accent1"/>
+              </a:solidFill>
+            </a:endParaRPr>
+          </a:p>
+          <a:p>
+            <a:r>
+              <a:rPr lang="en-US" dirty="0" smtClean="0">
+                <a:solidFill>
+                  <a:schemeClr val="accent1"/>
+                </a:solidFill>
+              </a:rPr>
+              <a:t>A </a:t>
+            </a:r>
+            <a:r>
+              <a:rPr lang="en-US" dirty="0" smtClean="0">
+                <a:solidFill>
+                  <a:schemeClr val="accent1"/>
+                </a:solidFill>
+              </a:rPr>
+              <a:t>501(c)3 </a:t>
+            </a:r>
+            <a:r>
+              <a:rPr lang="en-US" dirty="0" smtClean="0">
+                <a:solidFill>
+                  <a:schemeClr val="accent1"/>
+                </a:solidFill>
+              </a:rPr>
+              <a:t>nonprofit organization to accept </a:t>
+            </a:r>
+            <a:r>
+              <a:rPr lang="en-US" dirty="0" smtClean="0">
+                <a:solidFill>
+                  <a:schemeClr val="accent1"/>
+                </a:solidFill>
+              </a:rPr>
+              <a:t>funds and legally avoid taxes</a:t>
+            </a:r>
+          </a:p>
+          <a:p>
+            <a:endParaRPr lang="en-US" dirty="0" smtClean="0"/>
+          </a:p>
+          <a:p>
+            <a:endParaRPr lang="en-US" dirty="0" smtClean="0"/>
+          </a:p>
+          <a:p>
+            <a:endParaRPr lang="en-US" dirty="0"/>
+          </a:p>
+        </p:txBody>
+      </p:sp>
+    </p:spTree>
+  </p:cSld>
+  <p:clrMapOvr>
+    <a:masterClrMapping/>
+  </p:clrMapOvr>
 </p:sld>
 </file>
 
@@ -3435,11 +4217,222 @@
           </a:p>
         </p:txBody>
       </p:sp>
+      <p:sp>
+        <p:nvSpPr>
+          <p:cNvPr id="4098" name="AutoShape 2" descr="https://mail-attachment.googleusercontent.com/attachment/u/0/?ui=2&amp;ik=582f2b627b&amp;view=att&amp;th=14128c6b5c49ef16&amp;attid=0.1&amp;disp=inline&amp;realattid=1446372753890344960-local0&amp;safe=1&amp;zw&amp;saduie=AG9B_P_FNWaOn2c8Ii_GP4uacFcV&amp;sadet=1379368668660&amp;sads=YFZOJDVPZY0IDG0dyIkKM-TJdCU"/>
+          <p:cNvSpPr>
+            <a:spLocks noChangeAspect="1" noChangeArrowheads="1"/>
+          </p:cNvSpPr>
+          <p:nvPr/>
+        </p:nvSpPr>
+        <p:spPr bwMode="auto">
+          <a:xfrm>
+            <a:off x="155575" y="-144463"/>
+            <a:ext cx="304800" cy="304801"/>
+          </a:xfrm>
+          <a:prstGeom prst="rect">
+            <a:avLst/>
+          </a:prstGeom>
+          <a:noFill/>
+        </p:spPr>
+        <p:txBody>
+          <a:bodyPr vert="horz" wrap="square" lIns="91440" tIns="45720" rIns="91440" bIns="45720" numCol="1" anchor="t" anchorCtr="0" compatLnSpc="1">
+            <a:prstTxWarp prst="textNoShape">
+              <a:avLst/>
+            </a:prstTxWarp>
+          </a:bodyPr>
+          <a:lstStyle/>
+          <a:p>
+            <a:endParaRPr lang="en-US"/>
+          </a:p>
+        </p:txBody>
+      </p:sp>
+      <p:sp>
+        <p:nvSpPr>
+          <p:cNvPr id="4100" name="AutoShape 4" descr="https://mail-attachment.googleusercontent.com/attachment/u/0/?ui=2&amp;ik=582f2b627b&amp;view=att&amp;th=14128c6b5c49ef16&amp;attid=0.1&amp;disp=inline&amp;realattid=1446372753890344960-local0&amp;safe=1&amp;zw&amp;saduie=AG9B_P_FNWaOn2c8Ii_GP4uacFcV&amp;sadet=1379368668660&amp;sads=YFZOJDVPZY0IDG0dyIkKM-TJdCU"/>
+          <p:cNvSpPr>
+            <a:spLocks noChangeAspect="1" noChangeArrowheads="1"/>
+          </p:cNvSpPr>
+          <p:nvPr/>
+        </p:nvSpPr>
+        <p:spPr bwMode="auto">
+          <a:xfrm>
+            <a:off x="155575" y="-144463"/>
+            <a:ext cx="304800" cy="304801"/>
+          </a:xfrm>
+          <a:prstGeom prst="rect">
+            <a:avLst/>
+          </a:prstGeom>
+          <a:noFill/>
+        </p:spPr>
+        <p:txBody>
+          <a:bodyPr vert="horz" wrap="square" lIns="91440" tIns="45720" rIns="91440" bIns="45720" numCol="1" anchor="t" anchorCtr="0" compatLnSpc="1">
+            <a:prstTxWarp prst="textNoShape">
+              <a:avLst/>
+            </a:prstTxWarp>
+          </a:bodyPr>
+          <a:lstStyle/>
+          <a:p>
+            <a:endParaRPr lang="en-US"/>
+          </a:p>
+        </p:txBody>
+      </p:sp>
+      <p:sp>
+        <p:nvSpPr>
+          <p:cNvPr id="4102" name="AutoShape 6" descr="https://mail-attachment.googleusercontent.com/attachment/u/0/?ui=2&amp;ik=582f2b627b&amp;view=att&amp;th=14128c6b5c49ef16&amp;attid=0.1&amp;disp=inline&amp;realattid=1446372753890344960-local0&amp;safe=1&amp;zw&amp;saduie=AG9B_P_FNWaOn2c8Ii_GP4uacFcV&amp;sadet=1379368668660&amp;sads=YFZOJDVPZY0IDG0dyIkKM-TJdCU"/>
+          <p:cNvSpPr>
+            <a:spLocks noChangeAspect="1" noChangeArrowheads="1"/>
+          </p:cNvSpPr>
+          <p:nvPr/>
+        </p:nvSpPr>
+        <p:spPr bwMode="auto">
+          <a:xfrm>
+            <a:off x="155575" y="-144463"/>
+            <a:ext cx="304800" cy="304801"/>
+          </a:xfrm>
+          <a:prstGeom prst="rect">
+            <a:avLst/>
+          </a:prstGeom>
+          <a:noFill/>
+        </p:spPr>
+        <p:txBody>
+          <a:bodyPr vert="horz" wrap="square" lIns="91440" tIns="45720" rIns="91440" bIns="45720" numCol="1" anchor="t" anchorCtr="0" compatLnSpc="1">
+            <a:prstTxWarp prst="textNoShape">
+              <a:avLst/>
+            </a:prstTxWarp>
+          </a:bodyPr>
+          <a:lstStyle/>
+          <a:p>
+            <a:endParaRPr lang="en-US"/>
+          </a:p>
+        </p:txBody>
+      </p:sp>
+      <p:sp>
+        <p:nvSpPr>
+          <p:cNvPr id="4104" name="AutoShape 8" descr="https://mail-attachment.googleusercontent.com/attachment/u/0/?ui=2&amp;ik=582f2b627b&amp;view=att&amp;th=14128c6b5c49ef16&amp;attid=0.1&amp;disp=inline&amp;realattid=1446372753890344960-local0&amp;safe=1&amp;zw&amp;saduie=AG9B_P_FNWaOn2c8Ii_GP4uacFcV&amp;sadet=1379368668660&amp;sads=YFZOJDVPZY0IDG0dyIkKM-TJdCU"/>
+          <p:cNvSpPr>
+            <a:spLocks noChangeAspect="1" noChangeArrowheads="1"/>
+          </p:cNvSpPr>
+          <p:nvPr/>
+        </p:nvSpPr>
+        <p:spPr bwMode="auto">
+          <a:xfrm>
+            <a:off x="155575" y="-144463"/>
+            <a:ext cx="304800" cy="304801"/>
+          </a:xfrm>
+          <a:prstGeom prst="rect">
+            <a:avLst/>
+          </a:prstGeom>
+          <a:noFill/>
+        </p:spPr>
+        <p:txBody>
+          <a:bodyPr vert="horz" wrap="square" lIns="91440" tIns="45720" rIns="91440" bIns="45720" numCol="1" anchor="t" anchorCtr="0" compatLnSpc="1">
+            <a:prstTxWarp prst="textNoShape">
+              <a:avLst/>
+            </a:prstTxWarp>
+          </a:bodyPr>
+          <a:lstStyle/>
+          <a:p>
+            <a:endParaRPr lang="en-US"/>
+          </a:p>
+        </p:txBody>
+      </p:sp>
+      <p:sp>
+        <p:nvSpPr>
+          <p:cNvPr id="4106" name="AutoShape 10" descr="https://mail-attachment.googleusercontent.com/attachment/u/0/?ui=2&amp;ik=582f2b627b&amp;view=att&amp;th=14128c6b5c49ef16&amp;attid=0.1&amp;disp=inline&amp;realattid=1446372753890344960-local0&amp;safe=1&amp;zw&amp;saduie=AG9B_P_FNWaOn2c8Ii_GP4uacFcV&amp;sadet=1379368668660&amp;sads=YFZOJDVPZY0IDG0dyIkKM-TJdCU"/>
+          <p:cNvSpPr>
+            <a:spLocks noChangeAspect="1" noChangeArrowheads="1"/>
+          </p:cNvSpPr>
+          <p:nvPr/>
+        </p:nvSpPr>
+        <p:spPr bwMode="auto">
+          <a:xfrm>
+            <a:off x="155575" y="-144463"/>
+            <a:ext cx="304800" cy="304801"/>
+          </a:xfrm>
+          <a:prstGeom prst="rect">
+            <a:avLst/>
+          </a:prstGeom>
+          <a:noFill/>
+        </p:spPr>
+        <p:txBody>
+          <a:bodyPr vert="horz" wrap="square" lIns="91440" tIns="45720" rIns="91440" bIns="45720" numCol="1" anchor="t" anchorCtr="0" compatLnSpc="1">
+            <a:prstTxWarp prst="textNoShape">
+              <a:avLst/>
+            </a:prstTxWarp>
+          </a:bodyPr>
+          <a:lstStyle/>
+          <a:p>
+            <a:endParaRPr lang="en-US"/>
+          </a:p>
+        </p:txBody>
+      </p:sp>
+      <p:sp>
+        <p:nvSpPr>
+          <p:cNvPr id="4108" name="AutoShape 12" descr="https://mail-attachment.googleusercontent.com/attachment/u/0/?ui=2&amp;ik=582f2b627b&amp;view=att&amp;th=14128c6b5c49ef16&amp;attid=0.1&amp;disp=inline&amp;realattid=1446372753890344960-local0&amp;safe=1&amp;zw&amp;saduie=AG9B_P_FNWaOn2c8Ii_GP4uacFcV&amp;sadet=1379368668660&amp;sads=YFZOJDVPZY0IDG0dyIkKM-TJdCU"/>
+          <p:cNvSpPr>
+            <a:spLocks noChangeAspect="1" noChangeArrowheads="1"/>
+          </p:cNvSpPr>
+          <p:nvPr/>
+        </p:nvSpPr>
+        <p:spPr bwMode="auto">
+          <a:xfrm>
+            <a:off x="155575" y="-144463"/>
+            <a:ext cx="304800" cy="304801"/>
+          </a:xfrm>
+          <a:prstGeom prst="rect">
+            <a:avLst/>
+          </a:prstGeom>
+          <a:noFill/>
+        </p:spPr>
+        <p:txBody>
+          <a:bodyPr vert="horz" wrap="square" lIns="91440" tIns="45720" rIns="91440" bIns="45720" numCol="1" anchor="t" anchorCtr="0" compatLnSpc="1">
+            <a:prstTxWarp prst="textNoShape">
+              <a:avLst/>
+            </a:prstTxWarp>
+          </a:bodyPr>
+          <a:lstStyle/>
+          <a:p>
+            <a:endParaRPr lang="en-US"/>
+          </a:p>
+        </p:txBody>
+      </p:sp>
+      <p:pic>
+        <p:nvPicPr>
+          <p:cNvPr id="13" name="Picture 12" descr="v.01 In Action (1).jpg"/>
+          <p:cNvPicPr>
+            <a:picLocks noChangeAspect="1"/>
+          </p:cNvPicPr>
+          <p:nvPr/>
+        </p:nvPicPr>
+        <p:blipFill>
+          <a:blip r:embed="rId2" cstate="print"/>
+          <a:stretch>
+            <a:fillRect/>
+          </a:stretch>
+        </p:blipFill>
+        <p:spPr>
+          <a:xfrm>
+            <a:off x="2743200" y="3810000"/>
+            <a:ext cx="3657600" cy="2743200"/>
+          </a:xfrm>
+          <a:prstGeom prst="rect">
+            <a:avLst/>
+          </a:prstGeom>
+        </p:spPr>
+      </p:pic>
     </p:spTree>
   </p:cSld>
   <p:clrMapOvr>
     <a:masterClrMapping/>
   </p:clrMapOvr>
+  <p:timing>
+    <p:tnLst>
+      <p:par>
+        <p:cTn id="1" dur="indefinite" restart="never" nodeType="tmRoot"/>
+      </p:par>
+    </p:tnLst>
+  </p:timing>
 </p:sld>
 </file>
 
@@ -3460,154 +4453,42 @@
           <a:chExt cx="0" cy="0"/>
         </a:xfrm>
       </p:grpSpPr>
-      <p:sp>
-        <p:nvSpPr>
-          <p:cNvPr id="2" name="Title 1"/>
-          <p:cNvSpPr>
-            <a:spLocks noGrp="1"/>
-          </p:cNvSpPr>
-          <p:nvPr>
-            <p:ph type="title"/>
-          </p:nvPr>
-        </p:nvSpPr>
-        <p:spPr/>
-        <p:txBody>
-          <a:bodyPr/>
-          <a:lstStyle/>
-          <a:p>
-            <a:r>
-              <a:rPr lang="en-US" dirty="0" smtClean="0">
-                <a:solidFill>
-                  <a:schemeClr val="accent1"/>
-                </a:solidFill>
-              </a:rPr>
-              <a:t>Why is it good?</a:t>
-            </a:r>
-            <a:endParaRPr lang="en-US" dirty="0">
-              <a:solidFill>
-                <a:schemeClr val="accent1"/>
-              </a:solidFill>
-            </a:endParaRPr>
-          </a:p>
-        </p:txBody>
-      </p:sp>
-      <p:sp>
-        <p:nvSpPr>
-          <p:cNvPr id="3" name="Content Placeholder 2"/>
-          <p:cNvSpPr>
-            <a:spLocks noGrp="1"/>
-          </p:cNvSpPr>
-          <p:nvPr>
-            <p:ph idx="1"/>
-          </p:nvPr>
-        </p:nvSpPr>
-        <p:spPr/>
-        <p:txBody>
-          <a:bodyPr>
-            <a:normAutofit fontScale="92500"/>
-          </a:bodyPr>
-          <a:lstStyle/>
-          <a:p>
-            <a:r>
-              <a:rPr lang="en-US" dirty="0" smtClean="0">
-                <a:solidFill>
-                  <a:schemeClr val="accent1"/>
-                </a:solidFill>
-              </a:rPr>
-              <a:t>Convenient way of testing</a:t>
-            </a:r>
-          </a:p>
-          <a:p>
-            <a:r>
-              <a:rPr lang="en-US" dirty="0" smtClean="0">
-                <a:solidFill>
-                  <a:schemeClr val="accent1"/>
-                </a:solidFill>
-              </a:rPr>
-              <a:t>Patent for WESTA</a:t>
-            </a:r>
-          </a:p>
-          <a:p>
-            <a:r>
-              <a:rPr lang="en-US" dirty="0" smtClean="0">
-                <a:solidFill>
-                  <a:schemeClr val="accent1"/>
-                </a:solidFill>
-              </a:rPr>
-              <a:t>Spreading STEM</a:t>
-            </a:r>
-          </a:p>
-          <a:p>
-            <a:r>
-              <a:rPr lang="en-US" dirty="0" smtClean="0">
-                <a:solidFill>
-                  <a:schemeClr val="accent1"/>
-                </a:solidFill>
-              </a:rPr>
-              <a:t>Something to talk about for awards</a:t>
-            </a:r>
-          </a:p>
-          <a:p>
-            <a:r>
-              <a:rPr lang="en-US" dirty="0" smtClean="0">
-                <a:solidFill>
-                  <a:schemeClr val="accent1"/>
-                </a:solidFill>
-              </a:rPr>
-              <a:t>Service hours and experience for Westlake students making </a:t>
-            </a:r>
-            <a:r>
-              <a:rPr lang="en-US" dirty="0" err="1" smtClean="0">
-                <a:solidFill>
-                  <a:schemeClr val="accent1"/>
-                </a:solidFill>
-              </a:rPr>
-              <a:t>ChapRs</a:t>
-            </a:r>
-            <a:endParaRPr lang="en-US" dirty="0" smtClean="0">
-              <a:solidFill>
-                <a:schemeClr val="accent1"/>
-              </a:solidFill>
-            </a:endParaRPr>
-          </a:p>
-          <a:p>
-            <a:r>
-              <a:rPr lang="en-US" dirty="0" smtClean="0">
-                <a:solidFill>
-                  <a:schemeClr val="accent1"/>
-                </a:solidFill>
-              </a:rPr>
-              <a:t>Spreading the name of Westlake Robotics and every 4</a:t>
-            </a:r>
-            <a:r>
-              <a:rPr lang="en-US" baseline="30000" dirty="0" smtClean="0">
-                <a:solidFill>
-                  <a:schemeClr val="accent1"/>
-                </a:solidFill>
-              </a:rPr>
-              <a:t>th</a:t>
-            </a:r>
-            <a:r>
-              <a:rPr lang="en-US" dirty="0" smtClean="0">
-                <a:solidFill>
-                  <a:schemeClr val="accent1"/>
-                </a:solidFill>
-              </a:rPr>
-              <a:t> ChapR is given to a team in need for free</a:t>
-            </a:r>
-            <a:endParaRPr lang="en-US" dirty="0">
-              <a:solidFill>
-                <a:schemeClr val="accent1"/>
-              </a:solidFill>
-            </a:endParaRPr>
-          </a:p>
-        </p:txBody>
-      </p:sp>
+      <p:pic>
+        <p:nvPicPr>
+          <p:cNvPr id="4" name="Picture 3" descr="NXT Remote.JPG"/>
+          <p:cNvPicPr>
+            <a:picLocks noChangeAspect="1"/>
+          </p:cNvPicPr>
+          <p:nvPr/>
+        </p:nvPicPr>
+        <p:blipFill>
+          <a:blip r:embed="rId2" cstate="print"/>
+          <a:stretch>
+            <a:fillRect/>
+          </a:stretch>
+        </p:blipFill>
+        <p:spPr>
+          <a:xfrm>
+            <a:off x="0" y="0"/>
+            <a:ext cx="9144000" cy="6858000"/>
+          </a:xfrm>
+          <a:prstGeom prst="rect">
+            <a:avLst/>
+          </a:prstGeom>
+        </p:spPr>
+      </p:pic>
     </p:spTree>
   </p:cSld>
   <p:clrMapOvr>
     <a:masterClrMapping/>
   </p:clrMapOvr>
+  <p:timing>
+    <p:tnLst>
+      <p:par>
+        <p:cTn id="1" dur="indefinite" restart="never" nodeType="tmRoot"/>
+      </p:par>
+    </p:tnLst>
+  </p:timing>
 </p:sld>
 </file>
 
@@ -3628,171 +4509,66 @@
           <a:chExt cx="0" cy="0"/>
         </a:xfrm>
       </p:grpSpPr>
-      <p:sp>
-        <p:nvSpPr>
-          <p:cNvPr id="2" name="Title 1"/>
-          <p:cNvSpPr>
-            <a:spLocks noGrp="1"/>
-          </p:cNvSpPr>
-          <p:nvPr>
-            <p:ph type="title"/>
-          </p:nvPr>
-        </p:nvSpPr>
-        <p:spPr/>
-        <p:txBody>
-          <a:bodyPr/>
-          <a:lstStyle/>
-          <a:p>
-            <a:r>
-              <a:rPr lang="en-US" dirty="0" smtClean="0">
-                <a:solidFill>
-                  <a:schemeClr val="accent1"/>
-                </a:solidFill>
-              </a:rPr>
-              <a:t>Plan</a:t>
-            </a:r>
-            <a:endParaRPr lang="en-US" dirty="0">
-              <a:solidFill>
-                <a:schemeClr val="accent1"/>
-              </a:solidFill>
-            </a:endParaRPr>
-          </a:p>
-        </p:txBody>
-      </p:sp>
-      <p:sp>
-        <p:nvSpPr>
-          <p:cNvPr id="3" name="Content Placeholder 2"/>
-          <p:cNvSpPr>
-            <a:spLocks noGrp="1"/>
-          </p:cNvSpPr>
-          <p:nvPr>
-            <p:ph idx="1"/>
-          </p:nvPr>
-        </p:nvSpPr>
-        <p:spPr/>
-        <p:txBody>
-          <a:bodyPr>
-            <a:normAutofit fontScale="85000" lnSpcReduction="10000"/>
-          </a:bodyPr>
-          <a:lstStyle/>
-          <a:p>
-            <a:r>
-              <a:rPr lang="en-US" dirty="0" smtClean="0">
-                <a:solidFill>
-                  <a:schemeClr val="accent1"/>
-                </a:solidFill>
-              </a:rPr>
-              <a:t>Buy parts for 10 </a:t>
-            </a:r>
-            <a:r>
-              <a:rPr lang="en-US" dirty="0" err="1" smtClean="0">
-                <a:solidFill>
-                  <a:schemeClr val="accent1"/>
-                </a:solidFill>
-              </a:rPr>
-              <a:t>ChapRs</a:t>
-            </a:r>
-            <a:r>
-              <a:rPr lang="en-US" dirty="0" smtClean="0">
-                <a:solidFill>
-                  <a:schemeClr val="accent1"/>
-                </a:solidFill>
-              </a:rPr>
-              <a:t> (20 boards have been ordered)</a:t>
-            </a:r>
-          </a:p>
-          <a:p>
-            <a:r>
-              <a:rPr lang="en-US" dirty="0" smtClean="0">
-                <a:solidFill>
-                  <a:schemeClr val="accent1"/>
-                </a:solidFill>
-              </a:rPr>
-              <a:t>Set up 3 soldering stations and train 6 people to solder boards (3 of which would be the ChapR team)</a:t>
-            </a:r>
-          </a:p>
-          <a:p>
-            <a:r>
-              <a:rPr lang="en-US" dirty="0" smtClean="0">
-                <a:solidFill>
-                  <a:schemeClr val="accent1"/>
-                </a:solidFill>
-              </a:rPr>
-              <a:t>Get back in touch with the people who initially showed interest</a:t>
-            </a:r>
-          </a:p>
-          <a:p>
-            <a:r>
-              <a:rPr lang="en-US" dirty="0" smtClean="0">
-                <a:solidFill>
-                  <a:schemeClr val="accent1"/>
-                </a:solidFill>
-              </a:rPr>
-              <a:t>Send a ChapR to </a:t>
-            </a:r>
-            <a:r>
-              <a:rPr lang="en-US" dirty="0" err="1" smtClean="0">
-                <a:solidFill>
-                  <a:schemeClr val="accent1"/>
-                </a:solidFill>
-              </a:rPr>
-              <a:t>Irad</a:t>
-            </a:r>
-            <a:r>
-              <a:rPr lang="en-US" dirty="0" smtClean="0">
-                <a:solidFill>
-                  <a:schemeClr val="accent1"/>
-                </a:solidFill>
-              </a:rPr>
-              <a:t> Allen at VHS and David Calkins at Lego Education</a:t>
-            </a:r>
-          </a:p>
-          <a:p>
-            <a:r>
-              <a:rPr lang="en-US" dirty="0" smtClean="0">
-                <a:solidFill>
-                  <a:schemeClr val="accent1"/>
-                </a:solidFill>
-              </a:rPr>
-              <a:t>Keep in touch with the beta testers and fix bugs if necessary</a:t>
-            </a:r>
-          </a:p>
-          <a:p>
-            <a:r>
-              <a:rPr lang="en-US" dirty="0" smtClean="0">
-                <a:solidFill>
-                  <a:schemeClr val="accent1"/>
-                </a:solidFill>
-              </a:rPr>
-              <a:t>Give  4 </a:t>
-            </a:r>
-            <a:r>
-              <a:rPr lang="en-US" dirty="0" err="1" smtClean="0">
-                <a:solidFill>
-                  <a:schemeClr val="accent1"/>
-                </a:solidFill>
-              </a:rPr>
-              <a:t>ChapRs</a:t>
-            </a:r>
-            <a:r>
-              <a:rPr lang="en-US" dirty="0" smtClean="0">
-                <a:solidFill>
-                  <a:schemeClr val="accent1"/>
-                </a:solidFill>
-              </a:rPr>
-              <a:t> to Westlake</a:t>
-            </a:r>
-          </a:p>
-          <a:p>
-            <a:endParaRPr lang="en-US" dirty="0"/>
-          </a:p>
-        </p:txBody>
-      </p:sp>
+      <p:pic>
+        <p:nvPicPr>
+          <p:cNvPr id="5" name="Picture 4" descr="v.01 Board (3).jpg"/>
+          <p:cNvPicPr>
+            <a:picLocks noChangeAspect="1"/>
+          </p:cNvPicPr>
+          <p:nvPr/>
+        </p:nvPicPr>
+        <p:blipFill>
+          <a:blip r:embed="rId2" cstate="print"/>
+          <a:stretch>
+            <a:fillRect/>
+          </a:stretch>
+        </p:blipFill>
+        <p:spPr>
+          <a:xfrm>
+            <a:off x="0" y="0"/>
+            <a:ext cx="9144000" cy="6858000"/>
+          </a:xfrm>
+          <a:prstGeom prst="rect">
+            <a:avLst/>
+          </a:prstGeom>
+        </p:spPr>
+      </p:pic>
+      <p:pic>
+        <p:nvPicPr>
+          <p:cNvPr id="4" name="Picture 3" descr="v.01 Case (in context).jpg"/>
+          <p:cNvPicPr>
+            <a:picLocks noChangeAspect="1"/>
+          </p:cNvPicPr>
+          <p:nvPr/>
+        </p:nvPicPr>
+        <p:blipFill>
+          <a:blip r:embed="rId3" cstate="print"/>
+          <a:stretch>
+            <a:fillRect/>
+          </a:stretch>
+        </p:blipFill>
+        <p:spPr>
+          <a:xfrm>
+            <a:off x="0" y="4038600"/>
+            <a:ext cx="3759200" cy="2819400"/>
+          </a:xfrm>
+          <a:prstGeom prst="rect">
+            <a:avLst/>
+          </a:prstGeom>
+        </p:spPr>
+      </p:pic>
     </p:spTree>
   </p:cSld>
   <p:clrMapOvr>
     <a:masterClrMapping/>
   </p:clrMapOvr>
+  <p:timing>
+    <p:tnLst>
+      <p:par>
+        <p:cTn id="1" dur="indefinite" restart="never" nodeType="tmRoot"/>
+      </p:par>
+    </p:tnLst>
+  </p:timing>
 </p:sld>
 </file>
 
@@ -3813,6 +4589,305 @@
           <a:chExt cx="0" cy="0"/>
         </a:xfrm>
       </p:grpSpPr>
+      <p:pic>
+        <p:nvPicPr>
+          <p:cNvPr id="5" name="Picture 4" descr="v.02 Board.JPG"/>
+          <p:cNvPicPr>
+            <a:picLocks noChangeAspect="1"/>
+          </p:cNvPicPr>
+          <p:nvPr/>
+        </p:nvPicPr>
+        <p:blipFill>
+          <a:blip r:embed="rId2" cstate="print"/>
+          <a:stretch>
+            <a:fillRect/>
+          </a:stretch>
+        </p:blipFill>
+        <p:spPr>
+          <a:xfrm>
+            <a:off x="0" y="0"/>
+            <a:ext cx="9144000" cy="6858000"/>
+          </a:xfrm>
+          <a:prstGeom prst="rect">
+            <a:avLst/>
+          </a:prstGeom>
+        </p:spPr>
+      </p:pic>
+      <p:pic>
+        <p:nvPicPr>
+          <p:cNvPr id="7" name="Picture 6" descr="v.02 Case (edited).jpg"/>
+          <p:cNvPicPr>
+            <a:picLocks noChangeAspect="1"/>
+          </p:cNvPicPr>
+          <p:nvPr/>
+        </p:nvPicPr>
+        <p:blipFill>
+          <a:blip r:embed="rId3" cstate="print"/>
+          <a:stretch>
+            <a:fillRect/>
+          </a:stretch>
+        </p:blipFill>
+        <p:spPr>
+          <a:xfrm>
+            <a:off x="6128070" y="4642669"/>
+            <a:ext cx="3015930" cy="2215331"/>
+          </a:xfrm>
+          <a:prstGeom prst="rect">
+            <a:avLst/>
+          </a:prstGeom>
+        </p:spPr>
+      </p:pic>
+    </p:spTree>
+  </p:cSld>
+  <p:clrMapOvr>
+    <a:masterClrMapping/>
+  </p:clrMapOvr>
+  <p:timing>
+    <p:tnLst>
+      <p:par>
+        <p:cTn id="1" dur="indefinite" restart="never" nodeType="tmRoot"/>
+      </p:par>
+    </p:tnLst>
+  </p:timing>
+</p:sld>
+</file>
+
+<file path=ppt/slides/slide7.xml><?xml version="1.0" encoding="utf-8"?>
+<p:sld xmlns:a="http://schemas.openxmlformats.org/drawingml/2006/main" xmlns:r="http://schemas.openxmlformats.org/officeDocument/2006/relationships" xmlns:p="http://schemas.openxmlformats.org/presentationml/2006/main">
+  <p:cSld>
+    <p:spTree>
+      <p:nvGrpSpPr>
+        <p:cNvPr id="1" name=""/>
+        <p:cNvGrpSpPr/>
+        <p:nvPr/>
+      </p:nvGrpSpPr>
+      <p:grpSpPr>
+        <a:xfrm>
+          <a:off x="0" y="0"/>
+          <a:ext cx="0" cy="0"/>
+          <a:chOff x="0" y="0"/>
+          <a:chExt cx="0" cy="0"/>
+        </a:xfrm>
+      </p:grpSpPr>
+      <p:pic>
+        <p:nvPicPr>
+          <p:cNvPr id="4" name="Picture 3" descr="v.03 Case.jpg"/>
+          <p:cNvPicPr>
+            <a:picLocks noChangeAspect="1"/>
+          </p:cNvPicPr>
+          <p:nvPr/>
+        </p:nvPicPr>
+        <p:blipFill>
+          <a:blip r:embed="rId2" cstate="print"/>
+          <a:srcRect l="26667" t="17778" r="21667" b="33333"/>
+          <a:stretch>
+            <a:fillRect/>
+          </a:stretch>
+        </p:blipFill>
+        <p:spPr>
+          <a:xfrm>
+            <a:off x="914400" y="838200"/>
+            <a:ext cx="7193972" cy="5105400"/>
+          </a:xfrm>
+          <a:prstGeom prst="rect">
+            <a:avLst/>
+          </a:prstGeom>
+        </p:spPr>
+      </p:pic>
+    </p:spTree>
+  </p:cSld>
+  <p:clrMapOvr>
+    <a:masterClrMapping/>
+  </p:clrMapOvr>
+  <p:timing>
+    <p:tnLst>
+      <p:par>
+        <p:cTn id="1" dur="indefinite" restart="never" nodeType="tmRoot"/>
+      </p:par>
+    </p:tnLst>
+  </p:timing>
+</p:sld>
+</file>
+
+<file path=ppt/slides/slide8.xml><?xml version="1.0" encoding="utf-8"?>
+<p:sld xmlns:a="http://schemas.openxmlformats.org/drawingml/2006/main" xmlns:r="http://schemas.openxmlformats.org/officeDocument/2006/relationships" xmlns:p="http://schemas.openxmlformats.org/presentationml/2006/main">
+  <p:cSld>
+    <p:spTree>
+      <p:nvGrpSpPr>
+        <p:cNvPr id="1" name=""/>
+        <p:cNvGrpSpPr/>
+        <p:nvPr/>
+      </p:nvGrpSpPr>
+      <p:grpSpPr>
+        <a:xfrm>
+          <a:off x="0" y="0"/>
+          <a:ext cx="0" cy="0"/>
+          <a:chOff x="0" y="0"/>
+          <a:chExt cx="0" cy="0"/>
+        </a:xfrm>
+      </p:grpSpPr>
+      <p:pic>
+        <p:nvPicPr>
+          <p:cNvPr id="4" name="Picture 3" descr="v.03 Case.jpg"/>
+          <p:cNvPicPr>
+            <a:picLocks noChangeAspect="1"/>
+          </p:cNvPicPr>
+          <p:nvPr/>
+        </p:nvPicPr>
+        <p:blipFill>
+          <a:blip r:embed="rId2" cstate="print"/>
+          <a:srcRect l="26667" t="17778" r="21667" b="33333"/>
+          <a:stretch>
+            <a:fillRect/>
+          </a:stretch>
+        </p:blipFill>
+        <p:spPr>
+          <a:xfrm>
+            <a:off x="914400" y="838200"/>
+            <a:ext cx="7193972" cy="5105400"/>
+          </a:xfrm>
+          <a:prstGeom prst="rect">
+            <a:avLst/>
+          </a:prstGeom>
+        </p:spPr>
+      </p:pic>
+      <p:sp>
+        <p:nvSpPr>
+          <p:cNvPr id="3" name="Rectangle 2"/>
+          <p:cNvSpPr/>
+          <p:nvPr/>
+        </p:nvSpPr>
+        <p:spPr>
+          <a:xfrm rot="19738426">
+            <a:off x="1234437" y="1949605"/>
+            <a:ext cx="6553200" cy="2646878"/>
+          </a:xfrm>
+          <a:prstGeom prst="rect">
+            <a:avLst/>
+          </a:prstGeom>
+          <a:noFill/>
+        </p:spPr>
+        <p:txBody>
+          <a:bodyPr wrap="square" lIns="91440" tIns="45720" rIns="91440" bIns="45720">
+            <a:spAutoFit/>
+          </a:bodyPr>
+          <a:lstStyle/>
+          <a:p>
+            <a:pPr algn="ctr"/>
+            <a:r>
+              <a:rPr lang="en-US" sz="16600" b="1" cap="none" spc="300" dirty="0" smtClean="0">
+                <a:ln w="11430" cmpd="sng">
+                  <a:solidFill>
+                    <a:schemeClr val="accent1">
+                      <a:tint val="10000"/>
+                    </a:schemeClr>
+                  </a:solidFill>
+                  <a:prstDash val="solid"/>
+                  <a:miter lim="800000"/>
+                </a:ln>
+                <a:gradFill>
+                  <a:gsLst>
+                    <a:gs pos="10000">
+                      <a:schemeClr val="accent1">
+                        <a:tint val="83000"/>
+                        <a:shade val="100000"/>
+                        <a:satMod val="200000"/>
+                      </a:schemeClr>
+                    </a:gs>
+                    <a:gs pos="75000">
+                      <a:schemeClr val="accent1">
+                        <a:tint val="100000"/>
+                        <a:shade val="50000"/>
+                        <a:satMod val="150000"/>
+                      </a:schemeClr>
+                    </a:gs>
+                  </a:gsLst>
+                  <a:lin ang="5400000"/>
+                </a:gradFill>
+                <a:effectLst>
+                  <a:glow rad="45500">
+                    <a:schemeClr val="accent1">
+                      <a:satMod val="220000"/>
+                      <a:alpha val="35000"/>
+                    </a:schemeClr>
+                  </a:glow>
+                </a:effectLst>
+              </a:rPr>
+              <a:t>DEMO</a:t>
+            </a:r>
+            <a:endParaRPr lang="en-US" sz="5400" b="1" cap="none" spc="300" dirty="0">
+              <a:ln w="11430" cmpd="sng">
+                <a:solidFill>
+                  <a:schemeClr val="accent1">
+                    <a:tint val="10000"/>
+                  </a:schemeClr>
+                </a:solidFill>
+                <a:prstDash val="solid"/>
+                <a:miter lim="800000"/>
+              </a:ln>
+              <a:gradFill>
+                <a:gsLst>
+                  <a:gs pos="10000">
+                    <a:schemeClr val="accent1">
+                      <a:tint val="83000"/>
+                      <a:shade val="100000"/>
+                      <a:satMod val="200000"/>
+                    </a:schemeClr>
+                  </a:gs>
+                  <a:gs pos="75000">
+                    <a:schemeClr val="accent1">
+                      <a:tint val="100000"/>
+                      <a:shade val="50000"/>
+                      <a:satMod val="150000"/>
+                    </a:schemeClr>
+                  </a:gs>
+                </a:gsLst>
+                <a:lin ang="5400000"/>
+              </a:gradFill>
+              <a:effectLst>
+                <a:glow rad="45500">
+                  <a:schemeClr val="accent1">
+                    <a:satMod val="220000"/>
+                    <a:alpha val="35000"/>
+                  </a:schemeClr>
+                </a:glow>
+              </a:effectLst>
+            </a:endParaRPr>
+          </a:p>
+        </p:txBody>
+      </p:sp>
+    </p:spTree>
+  </p:cSld>
+  <p:clrMapOvr>
+    <a:masterClrMapping/>
+  </p:clrMapOvr>
+  <p:timing>
+    <p:tnLst>
+      <p:par>
+        <p:cTn id="1" dur="indefinite" restart="never" nodeType="tmRoot"/>
+      </p:par>
+    </p:tnLst>
+  </p:timing>
+</p:sld>
+</file>
+
+<file path=ppt/slides/slide9.xml><?xml version="1.0" encoding="utf-8"?>
+<p:sld xmlns:a="http://schemas.openxmlformats.org/drawingml/2006/main" xmlns:r="http://schemas.openxmlformats.org/officeDocument/2006/relationships" xmlns:p="http://schemas.openxmlformats.org/presentationml/2006/main">
+  <p:cSld>
+    <p:spTree>
+      <p:nvGrpSpPr>
+        <p:cNvPr id="1" name=""/>
+        <p:cNvGrpSpPr/>
+        <p:nvPr/>
+      </p:nvGrpSpPr>
+      <p:grpSpPr>
+        <a:xfrm>
+          <a:off x="0" y="0"/>
+          <a:ext cx="0" cy="0"/>
+          <a:chOff x="0" y="0"/>
+          <a:chExt cx="0" cy="0"/>
+        </a:xfrm>
+      </p:grpSpPr>
       <p:sp>
         <p:nvSpPr>
           <p:cNvPr id="2" name="Title 1"/>
@@ -3834,7 +4909,7 @@
                   <a:schemeClr val="accent1"/>
                 </a:solidFill>
               </a:rPr>
-              <a:t>What do we need?</a:t>
+              <a:t>ChapR Benefits: FTC Teams</a:t>
             </a:r>
             <a:endParaRPr lang="en-US" dirty="0">
               <a:solidFill>
@@ -3856,7 +4931,9 @@
         </p:nvSpPr>
         <p:spPr/>
         <p:txBody>
-          <a:bodyPr/>
+          <a:bodyPr>
+            <a:normAutofit/>
+          </a:bodyPr>
           <a:lstStyle/>
           <a:p>
             <a:r>
@@ -3865,25 +4942,15 @@
                   <a:schemeClr val="accent1"/>
                 </a:solidFill>
               </a:rPr>
-              <a:t>$450 total for 3 soldering stations</a:t>
-            </a:r>
-          </a:p>
-          <a:p>
+              <a:t>Convenient </a:t>
+            </a:r>
             <a:r>
               <a:rPr lang="en-US" dirty="0" smtClean="0">
                 <a:solidFill>
                   <a:schemeClr val="accent1"/>
                 </a:solidFill>
               </a:rPr>
-              <a:t>$1125 total for 15 </a:t>
-            </a:r>
-            <a:r>
-              <a:rPr lang="en-US" dirty="0" err="1" smtClean="0">
-                <a:solidFill>
-                  <a:schemeClr val="accent1"/>
-                </a:solidFill>
-              </a:rPr>
-              <a:t>ChapRs</a:t>
+              <a:t>way of </a:t>
             </a:r>
             <a:r>
               <a:rPr lang="en-US" dirty="0" smtClean="0">
@@ -3891,61 +4958,52 @@
                   <a:schemeClr val="accent1"/>
                 </a:solidFill>
               </a:rPr>
-              <a:t> at cost</a:t>
-            </a:r>
-          </a:p>
-          <a:p>
-            <a:pPr lvl="1"/>
+              <a:t>testing</a:t>
+            </a:r>
+          </a:p>
+          <a:p>
             <a:r>
               <a:rPr lang="en-US" dirty="0" smtClean="0">
                 <a:solidFill>
                   <a:schemeClr val="accent1"/>
                 </a:solidFill>
               </a:rPr>
-              <a:t>5 to reimburse Coach Eric</a:t>
-            </a:r>
-          </a:p>
-          <a:p>
-            <a:pPr lvl="1"/>
+              <a:t>Eliminates BT difficulties</a:t>
+            </a:r>
+          </a:p>
+          <a:p>
             <a:r>
               <a:rPr lang="en-US" dirty="0" smtClean="0">
                 <a:solidFill>
                   <a:schemeClr val="accent1"/>
                 </a:solidFill>
               </a:rPr>
-              <a:t>10 to build new </a:t>
-            </a:r>
-            <a:r>
-              <a:rPr lang="en-US" dirty="0" err="1" smtClean="0">
-                <a:solidFill>
-                  <a:schemeClr val="accent1"/>
-                </a:solidFill>
-              </a:rPr>
-              <a:t>ChapRs</a:t>
-            </a:r>
-            <a:endParaRPr lang="en-US" dirty="0">
+              <a:t>Provides easy competition-style driving</a:t>
+            </a:r>
+          </a:p>
+          <a:p>
+            <a:r>
+              <a:rPr lang="en-US" dirty="0" smtClean="0">
+                <a:solidFill>
+                  <a:schemeClr val="accent1"/>
+                </a:solidFill>
+              </a:rPr>
+              <a:t>Allows teams without access to multiple PCs to test effectively</a:t>
+            </a:r>
+            <a:endParaRPr lang="en-US" dirty="0" smtClean="0">
               <a:solidFill>
                 <a:schemeClr val="accent1"/>
               </a:solidFill>
             </a:endParaRPr>
           </a:p>
           <a:p>
-            <a:pPr lvl="1"/>
             <a:r>
               <a:rPr lang="en-US" dirty="0" smtClean="0">
                 <a:solidFill>
                   <a:schemeClr val="accent1"/>
                 </a:solidFill>
               </a:rPr>
-              <a:t>$1125  will  be returned after the sale of the </a:t>
-            </a:r>
-            <a:r>
-              <a:rPr lang="en-US" dirty="0" err="1" smtClean="0">
-                <a:solidFill>
-                  <a:schemeClr val="accent1"/>
-                </a:solidFill>
-              </a:rPr>
-              <a:t>ChapRs</a:t>
+              <a:t>We have received great feedback so far, both from teams at Worlds and through our </a:t>
             </a:r>
             <a:r>
               <a:rPr lang="en-US" dirty="0" smtClean="0">
@@ -3953,15 +5011,7 @@
                   <a:schemeClr val="accent1"/>
                 </a:solidFill>
               </a:rPr>
-              <a:t> (minus the 4 that go to </a:t>
-            </a:r>
-            <a:r>
-              <a:rPr lang="en-US" dirty="0">
-                <a:solidFill>
-                  <a:schemeClr val="accent1"/>
-                </a:solidFill>
-              </a:rPr>
-              <a:t>W</a:t>
+              <a:t>website</a:t>
             </a:r>
             <a:r>
               <a:rPr lang="en-US" dirty="0" smtClean="0">
@@ -3969,27 +5019,8 @@
                   <a:schemeClr val="accent1"/>
                 </a:solidFill>
               </a:rPr>
-              <a:t>estlake)</a:t>
-            </a:r>
-          </a:p>
-          <a:p>
-            <a:r>
-              <a:rPr lang="en-US" dirty="0" smtClean="0">
-                <a:solidFill>
-                  <a:schemeClr val="accent1"/>
-                </a:solidFill>
-              </a:rPr>
-              <a:t>A 501c3 nonprofit organization to accept funds</a:t>
-            </a:r>
-          </a:p>
-          <a:p>
-            <a:endParaRPr lang="en-US" dirty="0" smtClean="0"/>
-          </a:p>
-          <a:p>
-            <a:endParaRPr lang="en-US" dirty="0" smtClean="0"/>
-          </a:p>
-          <a:p>
-            <a:endParaRPr lang="en-US" dirty="0"/>
+              <a:t>!</a:t>
+            </a:r>
           </a:p>
         </p:txBody>
       </p:sp>
@@ -3998,6 +5029,13 @@
   <p:clrMapOvr>
     <a:masterClrMapping/>
   </p:clrMapOvr>
+  <p:timing>
+    <p:tnLst>
+      <p:par>
+        <p:cTn id="1" dur="indefinite" restart="never" nodeType="tmRoot"/>
+      </p:par>
+    </p:tnLst>
+  </p:timing>
 </p:sld>
 </file>
 

</xml_diff>

<commit_message>
Finished the board bring-up program.
</commit_message>
<xml_diff>
--- a/ChaprSVN/WESTA Presentation.pptx
+++ b/ChaprSVN/WESTA Presentation.pptx
@@ -300,7 +300,7 @@
             <a:fld id="{02176B21-4EA1-4084-A24C-8787C57D0319}" type="datetimeFigureOut">
               <a:rPr lang="en-US" smtClean="0"/>
               <a:pPr/>
-              <a:t>9/16/2013</a:t>
+              <a:t>9/19/2013</a:t>
             </a:fld>
             <a:endParaRPr lang="en-US"/>
           </a:p>
@@ -467,7 +467,7 @@
             <a:fld id="{02176B21-4EA1-4084-A24C-8787C57D0319}" type="datetimeFigureOut">
               <a:rPr lang="en-US" smtClean="0"/>
               <a:pPr/>
-              <a:t>9/16/2013</a:t>
+              <a:t>9/19/2013</a:t>
             </a:fld>
             <a:endParaRPr lang="en-US"/>
           </a:p>
@@ -644,7 +644,7 @@
             <a:fld id="{02176B21-4EA1-4084-A24C-8787C57D0319}" type="datetimeFigureOut">
               <a:rPr lang="en-US" smtClean="0"/>
               <a:pPr/>
-              <a:t>9/16/2013</a:t>
+              <a:t>9/19/2013</a:t>
             </a:fld>
             <a:endParaRPr lang="en-US"/>
           </a:p>
@@ -811,7 +811,7 @@
             <a:fld id="{02176B21-4EA1-4084-A24C-8787C57D0319}" type="datetimeFigureOut">
               <a:rPr lang="en-US" smtClean="0"/>
               <a:pPr/>
-              <a:t>9/16/2013</a:t>
+              <a:t>9/19/2013</a:t>
             </a:fld>
             <a:endParaRPr lang="en-US"/>
           </a:p>
@@ -1054,7 +1054,7 @@
             <a:fld id="{02176B21-4EA1-4084-A24C-8787C57D0319}" type="datetimeFigureOut">
               <a:rPr lang="en-US" smtClean="0"/>
               <a:pPr/>
-              <a:t>9/16/2013</a:t>
+              <a:t>9/19/2013</a:t>
             </a:fld>
             <a:endParaRPr lang="en-US"/>
           </a:p>
@@ -1339,7 +1339,7 @@
             <a:fld id="{02176B21-4EA1-4084-A24C-8787C57D0319}" type="datetimeFigureOut">
               <a:rPr lang="en-US" smtClean="0"/>
               <a:pPr/>
-              <a:t>9/16/2013</a:t>
+              <a:t>9/19/2013</a:t>
             </a:fld>
             <a:endParaRPr lang="en-US"/>
           </a:p>
@@ -1758,7 +1758,7 @@
             <a:fld id="{02176B21-4EA1-4084-A24C-8787C57D0319}" type="datetimeFigureOut">
               <a:rPr lang="en-US" smtClean="0"/>
               <a:pPr/>
-              <a:t>9/16/2013</a:t>
+              <a:t>9/19/2013</a:t>
             </a:fld>
             <a:endParaRPr lang="en-US"/>
           </a:p>
@@ -1873,7 +1873,7 @@
             <a:fld id="{02176B21-4EA1-4084-A24C-8787C57D0319}" type="datetimeFigureOut">
               <a:rPr lang="en-US" smtClean="0"/>
               <a:pPr/>
-              <a:t>9/16/2013</a:t>
+              <a:t>9/19/2013</a:t>
             </a:fld>
             <a:endParaRPr lang="en-US"/>
           </a:p>
@@ -1965,7 +1965,7 @@
             <a:fld id="{02176B21-4EA1-4084-A24C-8787C57D0319}" type="datetimeFigureOut">
               <a:rPr lang="en-US" smtClean="0"/>
               <a:pPr/>
-              <a:t>9/16/2013</a:t>
+              <a:t>9/19/2013</a:t>
             </a:fld>
             <a:endParaRPr lang="en-US"/>
           </a:p>
@@ -2239,7 +2239,7 @@
             <a:fld id="{02176B21-4EA1-4084-A24C-8787C57D0319}" type="datetimeFigureOut">
               <a:rPr lang="en-US" smtClean="0"/>
               <a:pPr/>
-              <a:t>9/16/2013</a:t>
+              <a:t>9/19/2013</a:t>
             </a:fld>
             <a:endParaRPr lang="en-US"/>
           </a:p>
@@ -2489,7 +2489,7 @@
             <a:fld id="{02176B21-4EA1-4084-A24C-8787C57D0319}" type="datetimeFigureOut">
               <a:rPr lang="en-US" smtClean="0"/>
               <a:pPr/>
-              <a:t>9/16/2013</a:t>
+              <a:t>9/19/2013</a:t>
             </a:fld>
             <a:endParaRPr lang="en-US"/>
           </a:p>
@@ -2699,7 +2699,7 @@
             <a:fld id="{02176B21-4EA1-4084-A24C-8787C57D0319}" type="datetimeFigureOut">
               <a:rPr lang="en-US" smtClean="0"/>
               <a:pPr/>
-              <a:t>9/16/2013</a:t>
+              <a:t>9/19/2013</a:t>
             </a:fld>
             <a:endParaRPr lang="en-US"/>
           </a:p>
@@ -3243,15 +3243,7 @@
                   <a:schemeClr val="accent1"/>
                 </a:solidFill>
               </a:rPr>
-              <a:t> ChapR is given to a team in need for </a:t>
-            </a:r>
-            <a:r>
-              <a:rPr lang="en-US" dirty="0" smtClean="0">
-                <a:solidFill>
-                  <a:schemeClr val="accent1"/>
-                </a:solidFill>
-              </a:rPr>
-              <a:t>free</a:t>
+              <a:t> ChapR is given to a team in need for free</a:t>
             </a:r>
           </a:p>
           <a:p>
@@ -3285,15 +3277,17 @@
                   <a:schemeClr val="accent1"/>
                 </a:solidFill>
               </a:rPr>
-              <a:t>Spreading the name of Westlake </a:t>
-            </a:r>
+              <a:t>Spreading the name of Westlake Robotics</a:t>
+            </a:r>
+          </a:p>
+          <a:p>
             <a:r>
               <a:rPr lang="en-US" dirty="0" smtClean="0">
                 <a:solidFill>
                   <a:schemeClr val="accent1"/>
                 </a:solidFill>
               </a:rPr>
-              <a:t>Robotics</a:t>
+              <a:t>Patent for WESTA (hopefully)</a:t>
             </a:r>
           </a:p>
           <a:p>
@@ -3303,60 +3297,8 @@
                   <a:schemeClr val="accent1"/>
                 </a:solidFill>
               </a:rPr>
-              <a:t>Patent </a:t>
-            </a:r>
-            <a:r>
-              <a:rPr lang="en-US" dirty="0" smtClean="0">
-                <a:solidFill>
-                  <a:schemeClr val="accent1"/>
-                </a:solidFill>
-              </a:rPr>
-              <a:t>for </a:t>
-            </a:r>
-            <a:r>
-              <a:rPr lang="en-US" dirty="0" smtClean="0">
-                <a:solidFill>
-                  <a:schemeClr val="accent1"/>
-                </a:solidFill>
-              </a:rPr>
-              <a:t>WESTA (hopefully)</a:t>
-            </a:r>
-            <a:endParaRPr lang="en-US" dirty="0" smtClean="0">
-              <a:solidFill>
-                <a:schemeClr val="accent1"/>
-              </a:solidFill>
-            </a:endParaRPr>
-          </a:p>
-          <a:p>
-            <a:r>
-              <a:rPr lang="en-US" dirty="0" smtClean="0">
-                <a:solidFill>
-                  <a:schemeClr val="accent1"/>
-                </a:solidFill>
-              </a:rPr>
-              <a:t>Something </a:t>
-            </a:r>
-            <a:r>
-              <a:rPr lang="en-US" dirty="0" smtClean="0">
-                <a:solidFill>
-                  <a:schemeClr val="accent1"/>
-                </a:solidFill>
-              </a:rPr>
-              <a:t>to talk about for </a:t>
-            </a:r>
-            <a:r>
-              <a:rPr lang="en-US" dirty="0" smtClean="0">
-                <a:solidFill>
-                  <a:schemeClr val="accent1"/>
-                </a:solidFill>
-              </a:rPr>
-              <a:t>awards</a:t>
-            </a:r>
-            <a:endParaRPr lang="en-US" dirty="0" smtClean="0">
-              <a:solidFill>
-                <a:schemeClr val="accent1"/>
-              </a:solidFill>
-            </a:endParaRPr>
+              <a:t>Something to talk about for awards</a:t>
+            </a:r>
           </a:p>
         </p:txBody>
       </p:sp>
@@ -3751,23 +3693,7 @@
                   <a:schemeClr val="accent1"/>
                 </a:solidFill>
               </a:rPr>
-              <a:t>$</a:t>
-            </a:r>
-            <a:r>
-              <a:rPr lang="en-US" smtClean="0">
-                <a:solidFill>
-                  <a:schemeClr val="accent1"/>
-                </a:solidFill>
-              </a:rPr>
-              <a:t>750</a:t>
-            </a:r>
-            <a:r>
-              <a:rPr lang="en-US" smtClean="0">
-                <a:solidFill>
-                  <a:schemeClr val="accent1"/>
-                </a:solidFill>
-              </a:rPr>
-              <a:t>  </a:t>
+              <a:t>$750  </a:t>
             </a:r>
             <a:r>
               <a:rPr lang="en-US" dirty="0" smtClean="0">
@@ -3807,15 +3733,7 @@
                   <a:schemeClr val="accent1"/>
                 </a:solidFill>
               </a:rPr>
-              <a:t>estlake</a:t>
-            </a:r>
-            <a:r>
-              <a:rPr lang="en-US" dirty="0" smtClean="0">
-                <a:solidFill>
-                  <a:schemeClr val="accent1"/>
-                </a:solidFill>
-              </a:rPr>
-              <a:t>)</a:t>
+              <a:t>estlake)</a:t>
             </a:r>
           </a:p>
           <a:p>
@@ -3833,31 +3751,7 @@
                   <a:schemeClr val="accent1"/>
                 </a:solidFill>
               </a:rPr>
-              <a:t>A </a:t>
-            </a:r>
-            <a:r>
-              <a:rPr lang="en-US" dirty="0" smtClean="0">
-                <a:solidFill>
-                  <a:schemeClr val="accent1"/>
-                </a:solidFill>
-              </a:rPr>
-              <a:t>501(c)3 </a:t>
-            </a:r>
-            <a:r>
-              <a:rPr lang="en-US" dirty="0" smtClean="0">
-                <a:solidFill>
-                  <a:schemeClr val="accent1"/>
-                </a:solidFill>
-              </a:rPr>
-              <a:t>nonprofit organization to accept </a:t>
-            </a:r>
-            <a:r>
-              <a:rPr lang="en-US" dirty="0" smtClean="0">
-                <a:solidFill>
-                  <a:schemeClr val="accent1"/>
-                </a:solidFill>
-              </a:rPr>
-              <a:t>funds and legally avoid taxes</a:t>
+              <a:t>A 501(c)3 nonprofit organization to accept funds and legally avoid taxes</a:t>
             </a:r>
           </a:p>
           <a:p>
@@ -4942,23 +4836,7 @@
                   <a:schemeClr val="accent1"/>
                 </a:solidFill>
               </a:rPr>
-              <a:t>Convenient </a:t>
-            </a:r>
-            <a:r>
-              <a:rPr lang="en-US" dirty="0" smtClean="0">
-                <a:solidFill>
-                  <a:schemeClr val="accent1"/>
-                </a:solidFill>
-              </a:rPr>
-              <a:t>way of </a:t>
-            </a:r>
-            <a:r>
-              <a:rPr lang="en-US" dirty="0" smtClean="0">
-                <a:solidFill>
-                  <a:schemeClr val="accent1"/>
-                </a:solidFill>
-              </a:rPr>
-              <a:t>testing</a:t>
+              <a:t>Convenient way of testing</a:t>
             </a:r>
           </a:p>
           <a:p>
@@ -4990,11 +4868,6 @@
               </a:rPr>
               <a:t>Allows teams without access to multiple PCs to test effectively</a:t>
             </a:r>
-            <a:endParaRPr lang="en-US" dirty="0" smtClean="0">
-              <a:solidFill>
-                <a:schemeClr val="accent1"/>
-              </a:solidFill>
-            </a:endParaRPr>
           </a:p>
           <a:p>
             <a:r>
@@ -5003,23 +4876,7 @@
                   <a:schemeClr val="accent1"/>
                 </a:solidFill>
               </a:rPr>
-              <a:t>We have received great feedback so far, both from teams at Worlds and through our </a:t>
-            </a:r>
-            <a:r>
-              <a:rPr lang="en-US" dirty="0" smtClean="0">
-                <a:solidFill>
-                  <a:schemeClr val="accent1"/>
-                </a:solidFill>
-              </a:rPr>
-              <a:t>website</a:t>
-            </a:r>
-            <a:r>
-              <a:rPr lang="en-US" dirty="0" smtClean="0">
-                <a:solidFill>
-                  <a:schemeClr val="accent1"/>
-                </a:solidFill>
-              </a:rPr>
-              <a:t>!</a:t>
+              <a:t>We have received great feedback so far, both from teams at Worlds and through our website!</a:t>
             </a:r>
           </a:p>
         </p:txBody>

</xml_diff>